<commit_message>
Updating workshop and slides
</commit_message>
<xml_diff>
--- a/NMA_WebApi.pptx
+++ b/NMA_WebApi.pptx
@@ -5,10 +5,10 @@
     <p:sldMasterId id="2147483648" r:id="rId4"/>
   </p:sldMasterIdLst>
   <p:notesMasterIdLst>
-    <p:notesMasterId r:id="rId31"/>
+    <p:notesMasterId r:id="rId32"/>
   </p:notesMasterIdLst>
   <p:handoutMasterIdLst>
-    <p:handoutMasterId r:id="rId32"/>
+    <p:handoutMasterId r:id="rId33"/>
   </p:handoutMasterIdLst>
   <p:sldIdLst>
     <p:sldId id="287" r:id="rId5"/>
@@ -37,6 +37,7 @@
     <p:sldId id="314" r:id="rId28"/>
     <p:sldId id="309" r:id="rId29"/>
     <p:sldId id="310" r:id="rId30"/>
+    <p:sldId id="315" r:id="rId31"/>
   </p:sldIdLst>
   <p:sldSz cx="12192000" cy="6858000"/>
   <p:notesSz cx="6858000" cy="9144000"/>
@@ -239,7 +240,7 @@
           <a:p>
             <a:fld id="{D7CE6DA9-01F9-4746-97A1-8BA451DDC44D}" type="datetimeFigureOut">
               <a:rPr lang="en-US" smtClean="0"/>
-              <a:t>8/15/2019</a:t>
+              <a:t>8/17/2019</a:t>
             </a:fld>
             <a:endParaRPr lang="en-US"/>
           </a:p>
@@ -404,7 +405,7 @@
           <a:p>
             <a:fld id="{BF8F1C4B-A09C-46D1-93DB-F3F848BFB027}" type="datetimeFigureOut">
               <a:rPr lang="en-US" smtClean="0"/>
-              <a:t>8/15/2019</a:t>
+              <a:t>8/17/2019</a:t>
             </a:fld>
             <a:endParaRPr lang="en-US"/>
           </a:p>
@@ -6903,6 +6904,74 @@
     <p:extLst>
       <p:ext uri="{BB962C8B-B14F-4D97-AF65-F5344CB8AC3E}">
         <p14:creationId xmlns:p14="http://schemas.microsoft.com/office/powerpoint/2010/main" val="533233653"/>
+      </p:ext>
+    </p:extLst>
+  </p:cSld>
+  <p:clrMapOvr>
+    <a:masterClrMapping/>
+  </p:clrMapOvr>
+  <p:transition>
+    <p:fade/>
+  </p:transition>
+</p:sld>
+</file>
+
+<file path=ppt/slides/slide27.xml><?xml version="1.0" encoding="utf-8"?>
+<p:sld xmlns:a="http://schemas.openxmlformats.org/drawingml/2006/main" xmlns:r="http://schemas.openxmlformats.org/officeDocument/2006/relationships" xmlns:p="http://schemas.openxmlformats.org/presentationml/2006/main">
+  <p:cSld>
+    <p:spTree>
+      <p:nvGrpSpPr>
+        <p:cNvPr id="1" name=""/>
+        <p:cNvGrpSpPr/>
+        <p:nvPr/>
+      </p:nvGrpSpPr>
+      <p:grpSpPr>
+        <a:xfrm>
+          <a:off x="0" y="0"/>
+          <a:ext cx="0" cy="0"/>
+          <a:chOff x="0" y="0"/>
+          <a:chExt cx="0" cy="0"/>
+        </a:xfrm>
+      </p:grpSpPr>
+      <p:sp>
+        <p:nvSpPr>
+          <p:cNvPr id="2" name="Title 1">
+            <a:extLst>
+              <a:ext uri="{FF2B5EF4-FFF2-40B4-BE49-F238E27FC236}">
+                <a16:creationId xmlns:a16="http://schemas.microsoft.com/office/drawing/2014/main" id="{1FF8A4CB-3533-4AEB-88F5-BFE54809A824}"/>
+              </a:ext>
+            </a:extLst>
+          </p:cNvPr>
+          <p:cNvSpPr>
+            <a:spLocks noGrp="1"/>
+          </p:cNvSpPr>
+          <p:nvPr>
+            <p:ph type="title"/>
+          </p:nvPr>
+        </p:nvSpPr>
+        <p:spPr>
+          <a:xfrm>
+            <a:off x="4254572" y="3049524"/>
+            <a:ext cx="3682855" cy="758952"/>
+          </a:xfrm>
+        </p:spPr>
+        <p:txBody>
+          <a:bodyPr>
+            <a:normAutofit/>
+          </a:bodyPr>
+          <a:lstStyle/>
+          <a:p>
+            <a:r>
+              <a:rPr lang="en-US" dirty="0"/>
+              <a:t>bit.ly/NMA_WebApi</a:t>
+            </a:r>
+          </a:p>
+        </p:txBody>
+      </p:sp>
+    </p:spTree>
+    <p:extLst>
+      <p:ext uri="{BB962C8B-B14F-4D97-AF65-F5344CB8AC3E}">
+        <p14:creationId xmlns:p14="http://schemas.microsoft.com/office/powerpoint/2010/main" val="2716243719"/>
       </p:ext>
     </p:extLst>
   </p:cSld>
@@ -9553,39 +9622,6 @@
 </file>
 
 <file path=customXml/item1.xml><?xml version="1.0" encoding="utf-8"?>
-<?mso-contentType ?>
-<FormTemplates xmlns="http://schemas.microsoft.com/sharepoint/v3/contenttype/forms">
-  <Display>DocumentLibraryForm</Display>
-  <Edit>DocumentLibraryForm</Edit>
-  <New>DocumentLibraryForm</New>
-</FormTemplates>
-</file>
-
-<file path=customXml/item2.xml><?xml version="1.0" encoding="utf-8"?>
-<p:properties xmlns:p="http://schemas.microsoft.com/office/2006/metadata/properties" xmlns:xsi="http://www.w3.org/2001/XMLSchema-instance" xmlns:pc="http://schemas.microsoft.com/office/infopath/2007/PartnerControls">
-  <documentManagement>
-    <SharedWithUsers xmlns="0a928224-53c8-4757-ac06-2fc380c83ae9">
-      <UserInfo>
-        <DisplayName>Christine Byrne</DisplayName>
-        <AccountId>29</AccountId>
-        <AccountType/>
-      </UserInfo>
-      <UserInfo>
-        <DisplayName>Subhamoy Kundu</DisplayName>
-        <AccountId>3563</AccountId>
-        <AccountType/>
-      </UserInfo>
-      <UserInfo>
-        <DisplayName>Orgho Bhattacharya - Intern</DisplayName>
-        <AccountId>4935</AccountId>
-        <AccountType/>
-      </UserInfo>
-    </SharedWithUsers>
-  </documentManagement>
-</p:properties>
-</file>
-
-<file path=customXml/item3.xml><?xml version="1.0" encoding="utf-8"?>
 <ct:contentTypeSchema xmlns:ct="http://schemas.microsoft.com/office/2006/metadata/contentType" xmlns:ma="http://schemas.microsoft.com/office/2006/metadata/properties/metaAttributes" ct:_="" ma:_="" ma:contentTypeName="Document" ma:contentTypeID="0x0101001248A51D8993A042BF3CE6FF2BAEE719" ma:contentTypeVersion="6" ma:contentTypeDescription="Create a new document." ma:contentTypeScope="" ma:versionID="d06f21c8b268c0f8e174646cb4b538c5">
   <xsd:schema xmlns:xsd="http://www.w3.org/2001/XMLSchema" xmlns:xs="http://www.w3.org/2001/XMLSchema" xmlns:p="http://schemas.microsoft.com/office/2006/metadata/properties" xmlns:ns2="30064335-6d9a-44a2-8bcb-0473bdd7467e" xmlns:ns3="0a928224-53c8-4757-ac06-2fc380c83ae9" targetNamespace="http://schemas.microsoft.com/office/2006/metadata/properties" ma:root="true" ma:fieldsID="7091b18bc8fb28a2d19104e7d802d1b5" ns2:_="" ns3:_="">
     <xsd:import namespace="30064335-6d9a-44a2-8bcb-0473bdd7467e"/>
@@ -9750,10 +9786,54 @@
 </ct:contentTypeSchema>
 </file>
 
+<file path=customXml/item2.xml><?xml version="1.0" encoding="utf-8"?>
+<p:properties xmlns:p="http://schemas.microsoft.com/office/2006/metadata/properties" xmlns:xsi="http://www.w3.org/2001/XMLSchema-instance" xmlns:pc="http://schemas.microsoft.com/office/infopath/2007/PartnerControls">
+  <documentManagement>
+    <SharedWithUsers xmlns="0a928224-53c8-4757-ac06-2fc380c83ae9">
+      <UserInfo>
+        <DisplayName>Christine Byrne</DisplayName>
+        <AccountId>29</AccountId>
+        <AccountType/>
+      </UserInfo>
+      <UserInfo>
+        <DisplayName>Subhamoy Kundu</DisplayName>
+        <AccountId>3563</AccountId>
+        <AccountType/>
+      </UserInfo>
+      <UserInfo>
+        <DisplayName>Orgho Bhattacharya - Intern</DisplayName>
+        <AccountId>4935</AccountId>
+        <AccountType/>
+      </UserInfo>
+    </SharedWithUsers>
+  </documentManagement>
+</p:properties>
+</file>
+
+<file path=customXml/item3.xml><?xml version="1.0" encoding="utf-8"?>
+<?mso-contentType ?>
+<FormTemplates xmlns="http://schemas.microsoft.com/sharepoint/v3/contenttype/forms">
+  <Display>DocumentLibraryForm</Display>
+  <Edit>DocumentLibraryForm</Edit>
+  <New>DocumentLibraryForm</New>
+</FormTemplates>
+</file>
+
 <file path=customXml/itemProps1.xml><?xml version="1.0" encoding="utf-8"?>
-<ds:datastoreItem xmlns:ds="http://schemas.openxmlformats.org/officeDocument/2006/customXml" ds:itemID="{ABB60422-E614-4046-A9CD-2F22BD7FEC0F}">
+<ds:datastoreItem xmlns:ds="http://schemas.openxmlformats.org/officeDocument/2006/customXml" ds:itemID="{84C6692A-B5F3-4C1C-9C5E-FEE7EA959F2A}">
   <ds:schemaRefs>
-    <ds:schemaRef ds:uri="http://schemas.microsoft.com/sharepoint/v3/contenttype/forms"/>
+    <ds:schemaRef ds:uri="http://schemas.microsoft.com/office/2006/metadata/contentType"/>
+    <ds:schemaRef ds:uri="http://schemas.microsoft.com/office/2006/metadata/properties/metaAttributes"/>
+    <ds:schemaRef ds:uri="http://www.w3.org/2001/XMLSchema"/>
+    <ds:schemaRef ds:uri="http://schemas.microsoft.com/office/2006/metadata/properties"/>
+    <ds:schemaRef ds:uri="30064335-6d9a-44a2-8bcb-0473bdd7467e"/>
+    <ds:schemaRef ds:uri="0a928224-53c8-4757-ac06-2fc380c83ae9"/>
+    <ds:schemaRef ds:uri="http://schemas.microsoft.com/office/2006/documentManagement/types"/>
+    <ds:schemaRef ds:uri="http://schemas.microsoft.com/office/infopath/2007/PartnerControls"/>
+    <ds:schemaRef ds:uri="http://schemas.openxmlformats.org/package/2006/metadata/core-properties"/>
+    <ds:schemaRef ds:uri="http://purl.org/dc/elements/1.1/"/>
+    <ds:schemaRef ds:uri="http://purl.org/dc/terms/"/>
+    <ds:schemaRef ds:uri="http://schemas.microsoft.com/internal/obd"/>
   </ds:schemaRefs>
 </ds:datastoreItem>
 </file>
@@ -9776,20 +9856,9 @@
 </file>
 
 <file path=customXml/itemProps3.xml><?xml version="1.0" encoding="utf-8"?>
-<ds:datastoreItem xmlns:ds="http://schemas.openxmlformats.org/officeDocument/2006/customXml" ds:itemID="{84C6692A-B5F3-4C1C-9C5E-FEE7EA959F2A}">
+<ds:datastoreItem xmlns:ds="http://schemas.openxmlformats.org/officeDocument/2006/customXml" ds:itemID="{ABB60422-E614-4046-A9CD-2F22BD7FEC0F}">
   <ds:schemaRefs>
-    <ds:schemaRef ds:uri="http://schemas.microsoft.com/office/2006/metadata/contentType"/>
-    <ds:schemaRef ds:uri="http://schemas.microsoft.com/office/2006/metadata/properties/metaAttributes"/>
-    <ds:schemaRef ds:uri="http://www.w3.org/2001/XMLSchema"/>
-    <ds:schemaRef ds:uri="http://schemas.microsoft.com/office/2006/metadata/properties"/>
-    <ds:schemaRef ds:uri="30064335-6d9a-44a2-8bcb-0473bdd7467e"/>
-    <ds:schemaRef ds:uri="0a928224-53c8-4757-ac06-2fc380c83ae9"/>
-    <ds:schemaRef ds:uri="http://schemas.microsoft.com/office/2006/documentManagement/types"/>
-    <ds:schemaRef ds:uri="http://schemas.microsoft.com/office/infopath/2007/PartnerControls"/>
-    <ds:schemaRef ds:uri="http://schemas.openxmlformats.org/package/2006/metadata/core-properties"/>
-    <ds:schemaRef ds:uri="http://purl.org/dc/elements/1.1/"/>
-    <ds:schemaRef ds:uri="http://purl.org/dc/terms/"/>
-    <ds:schemaRef ds:uri="http://schemas.microsoft.com/internal/obd"/>
+    <ds:schemaRef ds:uri="http://schemas.microsoft.com/sharepoint/v3/contenttype/forms"/>
   </ds:schemaRefs>
 </ds:datastoreItem>
 </file>
</xml_diff>